<commit_message>
nog meer presentatie cum
</commit_message>
<xml_diff>
--- a/Documentatie/presentatie.pptx
+++ b/Documentatie/presentatie.pptx
@@ -110,6 +110,11 @@
       </a:defRPr>
     </a:lvl9pPr>
   </p:defaultTextStyle>
+  <p:extLst>
+    <p:ext uri="{EFAFB233-063F-42B5-8137-9DF3F51BA10A}">
+      <p15:sldGuideLst xmlns:p15="http://schemas.microsoft.com/office/powerpoint/2012/main"/>
+    </p:ext>
+  </p:extLst>
 </p:presentation>
 </file>
 
@@ -6642,7 +6647,12 @@
             <p:ph type="title"/>
           </p:nvPr>
         </p:nvSpPr>
-        <p:spPr/>
+        <p:spPr>
+          <a:xfrm>
+            <a:off x="5024537" y="657808"/>
+            <a:ext cx="10394707" cy="1158140"/>
+          </a:xfrm>
+        </p:spPr>
         <p:txBody>
           <a:bodyPr/>
           <a:lstStyle/>
@@ -6675,61 +6685,69 @@
       </p:sp>
       <p:sp>
         <p:nvSpPr>
-          <p:cNvPr id="4" name="Content Placeholder 3"/>
-          <p:cNvSpPr>
-            <a:spLocks noGrp="1"/>
-          </p:cNvSpPr>
+          <p:cNvPr id="5" name="Text Placeholder 4"/>
+          <p:cNvSpPr>
+            <a:spLocks noGrp="1"/>
+          </p:cNvSpPr>
+          <p:nvPr>
+            <p:ph type="body" sz="quarter" idx="3"/>
+          </p:nvPr>
+        </p:nvSpPr>
+        <p:spPr/>
+        <p:txBody>
+          <a:bodyPr/>
+          <a:lstStyle/>
+          <a:p>
+            <a:endParaRPr lang="en-GB"/>
+          </a:p>
+        </p:txBody>
+      </p:sp>
+      <p:pic>
+        <p:nvPicPr>
+          <p:cNvPr id="14" name="Content Placeholder 13"/>
+          <p:cNvPicPr>
+            <a:picLocks noGrp="1" noChangeAspect="1"/>
+          </p:cNvPicPr>
+          <p:nvPr>
+            <p:ph sz="quarter" idx="14"/>
+          </p:nvPr>
+        </p:nvPicPr>
+        <p:blipFill>
+          <a:blip r:embed="rId2"/>
+          <a:stretch>
+            <a:fillRect/>
+          </a:stretch>
+        </p:blipFill>
+        <p:spPr>
+          <a:xfrm>
+            <a:off x="126983" y="163645"/>
+            <a:ext cx="4999207" cy="5330406"/>
+          </a:xfrm>
+        </p:spPr>
+      </p:pic>
+      <p:pic>
+        <p:nvPicPr>
+          <p:cNvPr id="8" name="Content Placeholder 7"/>
+          <p:cNvPicPr>
+            <a:picLocks noGrp="1" noChangeAspect="1"/>
+          </p:cNvPicPr>
           <p:nvPr>
             <p:ph sz="quarter" idx="13"/>
           </p:nvPr>
-        </p:nvSpPr>
-        <p:spPr/>
-        <p:txBody>
-          <a:bodyPr/>
-          <a:lstStyle/>
-          <a:p>
-            <a:endParaRPr lang="en-GB"/>
-          </a:p>
-        </p:txBody>
-      </p:sp>
-      <p:sp>
-        <p:nvSpPr>
-          <p:cNvPr id="5" name="Text Placeholder 4"/>
-          <p:cNvSpPr>
-            <a:spLocks noGrp="1"/>
-          </p:cNvSpPr>
-          <p:nvPr>
-            <p:ph type="body" sz="quarter" idx="3"/>
-          </p:nvPr>
-        </p:nvSpPr>
-        <p:spPr/>
-        <p:txBody>
-          <a:bodyPr/>
-          <a:lstStyle/>
-          <a:p>
-            <a:endParaRPr lang="en-GB"/>
-          </a:p>
-        </p:txBody>
-      </p:sp>
-      <p:sp>
-        <p:nvSpPr>
-          <p:cNvPr id="6" name="Content Placeholder 5"/>
-          <p:cNvSpPr>
-            <a:spLocks noGrp="1"/>
-          </p:cNvSpPr>
-          <p:nvPr>
-            <p:ph sz="quarter" idx="14"/>
-          </p:nvPr>
-        </p:nvSpPr>
-        <p:spPr/>
-        <p:txBody>
-          <a:bodyPr/>
-          <a:lstStyle/>
-          <a:p>
-            <a:endParaRPr lang="en-GB"/>
-          </a:p>
-        </p:txBody>
-      </p:sp>
+        </p:nvPicPr>
+        <p:blipFill>
+          <a:blip r:embed="rId3"/>
+          <a:stretch>
+            <a:fillRect/>
+          </a:stretch>
+        </p:blipFill>
+        <p:spPr>
+          <a:xfrm>
+            <a:off x="6674469" y="163645"/>
+            <a:ext cx="4988083" cy="5312310"/>
+          </a:xfrm>
+        </p:spPr>
+      </p:pic>
     </p:spTree>
     <p:extLst>
       <p:ext uri="{BB962C8B-B14F-4D97-AF65-F5344CB8AC3E}">

</xml_diff>

<commit_message>
Aanpassingenkjes presenatietje door Ashertje
</commit_message>
<xml_diff>
--- a/Documentatie/presentatie.pptx
+++ b/Documentatie/presentatie.pptx
@@ -575,7 +575,7 @@
           <a:p>
             <a:fld id="{F7AFFB9B-9FB8-469E-96F9-4D32314110B6}" type="datetimeFigureOut">
               <a:rPr lang="en-US" dirty="0"/>
-              <a:t>5/8/2017</a:t>
+              <a:t>5/11/2017</a:t>
             </a:fld>
             <a:endParaRPr lang="en-US" dirty="0"/>
           </a:p>
@@ -903,7 +903,7 @@
           <a:p>
             <a:fld id="{341D2AC3-6A0B-4169-B1EA-E3AE8B351BDD}" type="datetimeFigureOut">
               <a:rPr lang="en-US" dirty="0"/>
-              <a:t>5/8/2017</a:t>
+              <a:t>5/11/2017</a:t>
             </a:fld>
             <a:endParaRPr lang="en-US" dirty="0"/>
           </a:p>
@@ -1094,7 +1094,7 @@
           <a:p>
             <a:fld id="{DD4B9363-8B87-41B7-9F8E-64519CBB8F34}" type="datetimeFigureOut">
               <a:rPr lang="en-US" dirty="0"/>
-              <a:t>5/8/2017</a:t>
+              <a:t>5/11/2017</a:t>
             </a:fld>
             <a:endParaRPr lang="en-US" dirty="0"/>
           </a:p>
@@ -1359,7 +1359,7 @@
           <a:p>
             <a:fld id="{EAEF5746-5284-4951-9F37-7AE924EDBCB7}" type="datetimeFigureOut">
               <a:rPr lang="en-US" dirty="0"/>
-              <a:t>5/8/2017</a:t>
+              <a:t>5/11/2017</a:t>
             </a:fld>
             <a:endParaRPr lang="en-US" dirty="0"/>
           </a:p>
@@ -1782,7 +1782,7 @@
           <a:p>
             <a:fld id="{02398B29-7265-4A65-A2A4-6703C057B7C1}" type="datetimeFigureOut">
               <a:rPr lang="en-US" dirty="0"/>
-              <a:t>5/8/2017</a:t>
+              <a:t>5/11/2017</a:t>
             </a:fld>
             <a:endParaRPr lang="en-US" dirty="0"/>
           </a:p>
@@ -2327,7 +2327,7 @@
           <a:p>
             <a:fld id="{28FBA082-94DF-4C4B-A041-6624924AB0A8}" type="datetimeFigureOut">
               <a:rPr lang="en-US" dirty="0"/>
-              <a:t>5/8/2017</a:t>
+              <a:t>5/11/2017</a:t>
             </a:fld>
             <a:endParaRPr lang="en-US" dirty="0"/>
           </a:p>
@@ -3112,7 +3112,7 @@
           <a:p>
             <a:fld id="{B27686C4-3AB5-4E0C-86CA-FB108C350AA9}" type="datetimeFigureOut">
               <a:rPr lang="en-US" dirty="0"/>
-              <a:t>5/8/2017</a:t>
+              <a:t>5/11/2017</a:t>
             </a:fld>
             <a:endParaRPr lang="en-US" dirty="0"/>
           </a:p>
@@ -3286,7 +3286,7 @@
           <a:p>
             <a:fld id="{49FF1211-4E0C-4AB3-B04F-585959BDAFE8}" type="datetimeFigureOut">
               <a:rPr lang="en-US" dirty="0"/>
-              <a:t>5/8/2017</a:t>
+              <a:t>5/11/2017</a:t>
             </a:fld>
             <a:endParaRPr lang="en-US" dirty="0"/>
           </a:p>
@@ -3465,7 +3465,7 @@
           <a:p>
             <a:fld id="{28BDECAF-D3BE-4069-9C78-642ECCD01477}" type="datetimeFigureOut">
               <a:rPr lang="en-US" dirty="0"/>
-              <a:t>5/8/2017</a:t>
+              <a:t>5/11/2017</a:t>
             </a:fld>
             <a:endParaRPr lang="en-US" dirty="0"/>
           </a:p>
@@ -3635,7 +3635,7 @@
           <a:p>
             <a:fld id="{8EFBDC27-E420-4878-9EE6-7B9656D6442A}" type="datetimeFigureOut">
               <a:rPr lang="en-US" dirty="0"/>
-              <a:t>5/8/2017</a:t>
+              <a:t>5/11/2017</a:t>
             </a:fld>
             <a:endParaRPr lang="en-US" dirty="0"/>
           </a:p>
@@ -3880,7 +3880,7 @@
           <a:p>
             <a:fld id="{0F7F47CF-67C9-420C-80A5-E2069FF0C2DF}" type="datetimeFigureOut">
               <a:rPr lang="en-US" dirty="0"/>
-              <a:t>5/8/2017</a:t>
+              <a:t>5/11/2017</a:t>
             </a:fld>
             <a:endParaRPr lang="en-US" dirty="0"/>
           </a:p>
@@ -4112,7 +4112,7 @@
           <a:p>
             <a:fld id="{AE22DC73-F065-42F5-A9F2-D90B2E42A0B3}" type="datetimeFigureOut">
               <a:rPr lang="en-US" dirty="0"/>
-              <a:t>5/8/2017</a:t>
+              <a:t>5/11/2017</a:t>
             </a:fld>
             <a:endParaRPr lang="en-US" dirty="0"/>
           </a:p>
@@ -4492,7 +4492,7 @@
           <a:p>
             <a:fld id="{76BEA702-9B29-41CC-9BCC-3DF8A0D379FE}" type="datetimeFigureOut">
               <a:rPr lang="en-US" dirty="0"/>
-              <a:t>5/8/2017</a:t>
+              <a:t>5/11/2017</a:t>
             </a:fld>
             <a:endParaRPr lang="en-US" dirty="0"/>
           </a:p>
@@ -4605,7 +4605,7 @@
           <a:p>
             <a:fld id="{097649AC-CB8F-4FF1-9A34-5861C74DD0A7}" type="datetimeFigureOut">
               <a:rPr lang="en-US" dirty="0"/>
-              <a:t>5/8/2017</a:t>
+              <a:t>5/11/2017</a:t>
             </a:fld>
             <a:endParaRPr lang="en-US" dirty="0"/>
           </a:p>
@@ -4695,7 +4695,7 @@
           <a:p>
             <a:fld id="{3EC5CECA-2D3A-4680-9B49-752200DE467C}" type="datetimeFigureOut">
               <a:rPr lang="en-US" dirty="0"/>
-              <a:t>5/8/2017</a:t>
+              <a:t>5/11/2017</a:t>
             </a:fld>
             <a:endParaRPr lang="en-US" dirty="0"/>
           </a:p>
@@ -4943,7 +4943,7 @@
           <a:p>
             <a:fld id="{50C3BFE2-83B7-4B0A-B9D3-AB28331082B3}" type="datetimeFigureOut">
               <a:rPr lang="en-US" dirty="0"/>
-              <a:t>5/8/2017</a:t>
+              <a:t>5/11/2017</a:t>
             </a:fld>
             <a:endParaRPr lang="en-US" dirty="0"/>
           </a:p>
@@ -5207,7 +5207,7 @@
           <a:p>
             <a:fld id="{12EF78E3-FDA3-4D28-AAA2-0B81F349A39D}" type="datetimeFigureOut">
               <a:rPr lang="en-US" dirty="0"/>
-              <a:t>5/8/2017</a:t>
+              <a:t>5/11/2017</a:t>
             </a:fld>
             <a:endParaRPr lang="en-US" dirty="0"/>
           </a:p>
@@ -5605,7 +5605,7 @@
           <a:p>
             <a:fld id="{C35BB1C6-BF8F-4481-8AB2-603A1C8A906A}" type="datetimeFigureOut">
               <a:rPr lang="en-US" dirty="0"/>
-              <a:t>5/8/2017</a:t>
+              <a:t>5/11/2017</a:t>
             </a:fld>
             <a:endParaRPr lang="en-US" dirty="0"/>
           </a:p>
@@ -6568,12 +6568,16 @@
           <a:lstStyle/>
           <a:p>
             <a:r>
-              <a:rPr lang="en-GB" dirty="0" err="1"/>
-              <a:t>Fpsshap</a:t>
+              <a:rPr lang="en-GB" dirty="0" err="1" smtClean="0"/>
+              <a:t>Fpshap</a:t>
+            </a:r>
+            <a:r>
+              <a:rPr lang="en-GB" dirty="0" smtClean="0"/>
+              <a:t> </a:t>
             </a:r>
             <a:r>
               <a:rPr lang="en-GB" dirty="0"/>
-              <a:t> Game</a:t>
+              <a:t>Game</a:t>
             </a:r>
           </a:p>
           <a:p>

</xml_diff>

<commit_message>
fucks uit de presentatie
</commit_message>
<xml_diff>
--- a/Documentatie/presentatie.pptx
+++ b/Documentatie/presentatie.pptx
@@ -575,7 +575,7 @@
           <a:p>
             <a:fld id="{F7AFFB9B-9FB8-469E-96F9-4D32314110B6}" type="datetimeFigureOut">
               <a:rPr lang="en-US" dirty="0"/>
-              <a:t>5/11/2017</a:t>
+              <a:t>5/14/2017</a:t>
             </a:fld>
             <a:endParaRPr lang="en-US" dirty="0"/>
           </a:p>
@@ -903,7 +903,7 @@
           <a:p>
             <a:fld id="{341D2AC3-6A0B-4169-B1EA-E3AE8B351BDD}" type="datetimeFigureOut">
               <a:rPr lang="en-US" dirty="0"/>
-              <a:t>5/11/2017</a:t>
+              <a:t>5/14/2017</a:t>
             </a:fld>
             <a:endParaRPr lang="en-US" dirty="0"/>
           </a:p>
@@ -1094,7 +1094,7 @@
           <a:p>
             <a:fld id="{DD4B9363-8B87-41B7-9F8E-64519CBB8F34}" type="datetimeFigureOut">
               <a:rPr lang="en-US" dirty="0"/>
-              <a:t>5/11/2017</a:t>
+              <a:t>5/14/2017</a:t>
             </a:fld>
             <a:endParaRPr lang="en-US" dirty="0"/>
           </a:p>
@@ -1359,7 +1359,7 @@
           <a:p>
             <a:fld id="{EAEF5746-5284-4951-9F37-7AE924EDBCB7}" type="datetimeFigureOut">
               <a:rPr lang="en-US" dirty="0"/>
-              <a:t>5/11/2017</a:t>
+              <a:t>5/14/2017</a:t>
             </a:fld>
             <a:endParaRPr lang="en-US" dirty="0"/>
           </a:p>
@@ -1782,7 +1782,7 @@
           <a:p>
             <a:fld id="{02398B29-7265-4A65-A2A4-6703C057B7C1}" type="datetimeFigureOut">
               <a:rPr lang="en-US" dirty="0"/>
-              <a:t>5/11/2017</a:t>
+              <a:t>5/14/2017</a:t>
             </a:fld>
             <a:endParaRPr lang="en-US" dirty="0"/>
           </a:p>
@@ -2327,7 +2327,7 @@
           <a:p>
             <a:fld id="{28FBA082-94DF-4C4B-A041-6624924AB0A8}" type="datetimeFigureOut">
               <a:rPr lang="en-US" dirty="0"/>
-              <a:t>5/11/2017</a:t>
+              <a:t>5/14/2017</a:t>
             </a:fld>
             <a:endParaRPr lang="en-US" dirty="0"/>
           </a:p>
@@ -3112,7 +3112,7 @@
           <a:p>
             <a:fld id="{B27686C4-3AB5-4E0C-86CA-FB108C350AA9}" type="datetimeFigureOut">
               <a:rPr lang="en-US" dirty="0"/>
-              <a:t>5/11/2017</a:t>
+              <a:t>5/14/2017</a:t>
             </a:fld>
             <a:endParaRPr lang="en-US" dirty="0"/>
           </a:p>
@@ -3286,7 +3286,7 @@
           <a:p>
             <a:fld id="{49FF1211-4E0C-4AB3-B04F-585959BDAFE8}" type="datetimeFigureOut">
               <a:rPr lang="en-US" dirty="0"/>
-              <a:t>5/11/2017</a:t>
+              <a:t>5/14/2017</a:t>
             </a:fld>
             <a:endParaRPr lang="en-US" dirty="0"/>
           </a:p>
@@ -3465,7 +3465,7 @@
           <a:p>
             <a:fld id="{28BDECAF-D3BE-4069-9C78-642ECCD01477}" type="datetimeFigureOut">
               <a:rPr lang="en-US" dirty="0"/>
-              <a:t>5/11/2017</a:t>
+              <a:t>5/14/2017</a:t>
             </a:fld>
             <a:endParaRPr lang="en-US" dirty="0"/>
           </a:p>
@@ -3635,7 +3635,7 @@
           <a:p>
             <a:fld id="{8EFBDC27-E420-4878-9EE6-7B9656D6442A}" type="datetimeFigureOut">
               <a:rPr lang="en-US" dirty="0"/>
-              <a:t>5/11/2017</a:t>
+              <a:t>5/14/2017</a:t>
             </a:fld>
             <a:endParaRPr lang="en-US" dirty="0"/>
           </a:p>
@@ -3880,7 +3880,7 @@
           <a:p>
             <a:fld id="{0F7F47CF-67C9-420C-80A5-E2069FF0C2DF}" type="datetimeFigureOut">
               <a:rPr lang="en-US" dirty="0"/>
-              <a:t>5/11/2017</a:t>
+              <a:t>5/14/2017</a:t>
             </a:fld>
             <a:endParaRPr lang="en-US" dirty="0"/>
           </a:p>
@@ -4112,7 +4112,7 @@
           <a:p>
             <a:fld id="{AE22DC73-F065-42F5-A9F2-D90B2E42A0B3}" type="datetimeFigureOut">
               <a:rPr lang="en-US" dirty="0"/>
-              <a:t>5/11/2017</a:t>
+              <a:t>5/14/2017</a:t>
             </a:fld>
             <a:endParaRPr lang="en-US" dirty="0"/>
           </a:p>
@@ -4492,7 +4492,7 @@
           <a:p>
             <a:fld id="{76BEA702-9B29-41CC-9BCC-3DF8A0D379FE}" type="datetimeFigureOut">
               <a:rPr lang="en-US" dirty="0"/>
-              <a:t>5/11/2017</a:t>
+              <a:t>5/14/2017</a:t>
             </a:fld>
             <a:endParaRPr lang="en-US" dirty="0"/>
           </a:p>
@@ -4605,7 +4605,7 @@
           <a:p>
             <a:fld id="{097649AC-CB8F-4FF1-9A34-5861C74DD0A7}" type="datetimeFigureOut">
               <a:rPr lang="en-US" dirty="0"/>
-              <a:t>5/11/2017</a:t>
+              <a:t>5/14/2017</a:t>
             </a:fld>
             <a:endParaRPr lang="en-US" dirty="0"/>
           </a:p>
@@ -4695,7 +4695,7 @@
           <a:p>
             <a:fld id="{3EC5CECA-2D3A-4680-9B49-752200DE467C}" type="datetimeFigureOut">
               <a:rPr lang="en-US" dirty="0"/>
-              <a:t>5/11/2017</a:t>
+              <a:t>5/14/2017</a:t>
             </a:fld>
             <a:endParaRPr lang="en-US" dirty="0"/>
           </a:p>
@@ -4943,7 +4943,7 @@
           <a:p>
             <a:fld id="{50C3BFE2-83B7-4B0A-B9D3-AB28331082B3}" type="datetimeFigureOut">
               <a:rPr lang="en-US" dirty="0"/>
-              <a:t>5/11/2017</a:t>
+              <a:t>5/14/2017</a:t>
             </a:fld>
             <a:endParaRPr lang="en-US" dirty="0"/>
           </a:p>
@@ -5207,7 +5207,7 @@
           <a:p>
             <a:fld id="{12EF78E3-FDA3-4D28-AAA2-0B81F349A39D}" type="datetimeFigureOut">
               <a:rPr lang="en-US" dirty="0"/>
-              <a:t>5/11/2017</a:t>
+              <a:t>5/14/2017</a:t>
             </a:fld>
             <a:endParaRPr lang="en-US" dirty="0"/>
           </a:p>
@@ -5605,7 +5605,7 @@
           <a:p>
             <a:fld id="{C35BB1C6-BF8F-4481-8AB2-603A1C8A906A}" type="datetimeFigureOut">
               <a:rPr lang="en-US" dirty="0"/>
-              <a:t>5/11/2017</a:t>
+              <a:t>5/14/2017</a:t>
             </a:fld>
             <a:endParaRPr lang="en-US" dirty="0"/>
           </a:p>
@@ -6108,30 +6108,6 @@
           </a:p>
         </p:txBody>
       </p:sp>
-      <p:pic>
-        <p:nvPicPr>
-          <p:cNvPr id="5" name="Picture 4"/>
-          <p:cNvPicPr>
-            <a:picLocks noChangeAspect="1"/>
-          </p:cNvPicPr>
-          <p:nvPr/>
-        </p:nvPicPr>
-        <p:blipFill>
-          <a:blip r:embed="rId2"/>
-          <a:stretch>
-            <a:fillRect/>
-          </a:stretch>
-        </p:blipFill>
-        <p:spPr>
-          <a:xfrm>
-            <a:off x="202640" y="2268453"/>
-            <a:ext cx="1914525" cy="2390775"/>
-          </a:xfrm>
-          <a:prstGeom prst="rect">
-            <a:avLst/>
-          </a:prstGeom>
-        </p:spPr>
-      </p:pic>
     </p:spTree>
     <p:extLst>
       <p:ext uri="{BB962C8B-B14F-4D97-AF65-F5344CB8AC3E}">
@@ -6989,10 +6965,6 @@
           <a:bodyPr/>
           <a:lstStyle/>
           <a:p>
-            <a:r>
-              <a:rPr lang="en-GB" dirty="0"/>
-              <a:t>Fuck you!</a:t>
-            </a:r>
             <a:br>
               <a:rPr lang="en-GB" dirty="0"/>
             </a:br>

</xml_diff>